<commit_message>
thêm nhận xét các nhóm
</commit_message>
<xml_diff>
--- a/DP version 1.2.pptx
+++ b/DP version 1.2.pptx
@@ -309,7 +309,7 @@
           <a:p>
             <a:fld id="{784AA43A-3F76-4A13-9CD6-36134EB429E3}" type="datetimeFigureOut">
               <a:rPr lang="en-US"/>
-              <a:t>11/5/2016</a:t>
+              <a:t>11/19/2016</a:t>
             </a:fld>
             <a:endParaRPr/>
           </a:p>
@@ -474,7 +474,7 @@
           <a:p>
             <a:fld id="{5F674A4F-2B7A-4ECB-A400-260B2FFC03C1}" type="datetimeFigureOut">
               <a:rPr lang="en-US"/>
-              <a:t>11/5/2016</a:t>
+              <a:t>11/19/2016</a:t>
             </a:fld>
             <a:endParaRPr/>
           </a:p>
@@ -1766,7 +1766,7 @@
             <a:fld id="{B61BEF0D-F0BB-DE4B-95CE-6DB70DBA9567}" type="datetimeFigureOut">
               <a:rPr lang="en-US" smtClean="0"/>
               <a:pPr/>
-              <a:t>11/5/2016</a:t>
+              <a:t>11/19/2016</a:t>
             </a:fld>
             <a:endParaRPr lang="en-US" dirty="0"/>
           </a:p>
@@ -1987,7 +1987,7 @@
           <a:p>
             <a:fld id="{9AFE8FB1-0A7A-443E-AAF7-31D4FA1AA312}" type="datetimeFigureOut">
               <a:rPr lang="en-US" smtClean="0"/>
-              <a:t>11/5/2016</a:t>
+              <a:t>11/19/2016</a:t>
             </a:fld>
             <a:endParaRPr lang="en-US"/>
           </a:p>
@@ -2255,7 +2255,7 @@
           <a:p>
             <a:fld id="{9AFE8FB1-0A7A-443E-AAF7-31D4FA1AA312}" type="datetimeFigureOut">
               <a:rPr lang="en-US" smtClean="0"/>
-              <a:t>11/5/2016</a:t>
+              <a:t>11/19/2016</a:t>
             </a:fld>
             <a:endParaRPr lang="en-US"/>
           </a:p>
@@ -2469,7 +2469,7 @@
           <a:p>
             <a:fld id="{9AFE8FB1-0A7A-443E-AAF7-31D4FA1AA312}" type="datetimeFigureOut">
               <a:rPr lang="en-US" smtClean="0"/>
-              <a:t>11/5/2016</a:t>
+              <a:t>11/19/2016</a:t>
             </a:fld>
             <a:endParaRPr lang="en-US"/>
           </a:p>
@@ -2824,7 +2824,7 @@
           <a:p>
             <a:fld id="{9AFE8FB1-0A7A-443E-AAF7-31D4FA1AA312}" type="datetimeFigureOut">
               <a:rPr lang="en-US" smtClean="0"/>
-              <a:t>11/5/2016</a:t>
+              <a:t>11/19/2016</a:t>
             </a:fld>
             <a:endParaRPr lang="en-US"/>
           </a:p>
@@ -3111,7 +3111,7 @@
           <a:p>
             <a:fld id="{9AFE8FB1-0A7A-443E-AAF7-31D4FA1AA312}" type="datetimeFigureOut">
               <a:rPr lang="en-US" smtClean="0"/>
-              <a:t>11/5/2016</a:t>
+              <a:t>11/19/2016</a:t>
             </a:fld>
             <a:endParaRPr lang="en-US"/>
           </a:p>
@@ -3502,7 +3502,7 @@
           <a:p>
             <a:fld id="{9AFE8FB1-0A7A-443E-AAF7-31D4FA1AA312}" type="datetimeFigureOut">
               <a:rPr lang="en-US" smtClean="0"/>
-              <a:t>11/5/2016</a:t>
+              <a:t>11/19/2016</a:t>
             </a:fld>
             <a:endParaRPr lang="en-US"/>
           </a:p>
@@ -3632,7 +3632,7 @@
           <a:p>
             <a:fld id="{9AFE8FB1-0A7A-443E-AAF7-31D4FA1AA312}" type="datetimeFigureOut">
               <a:rPr lang="en-US" smtClean="0"/>
-              <a:t>11/5/2016</a:t>
+              <a:t>11/19/2016</a:t>
             </a:fld>
             <a:endParaRPr lang="en-US"/>
           </a:p>
@@ -3815,7 +3815,7 @@
           <a:p>
             <a:fld id="{9AFE8FB1-0A7A-443E-AAF7-31D4FA1AA312}" type="datetimeFigureOut">
               <a:rPr lang="en-US" smtClean="0"/>
-              <a:t>11/5/2016</a:t>
+              <a:t>11/19/2016</a:t>
             </a:fld>
             <a:endParaRPr lang="en-US"/>
           </a:p>
@@ -4181,7 +4181,7 @@
           <a:p>
             <a:fld id="{9AFE8FB1-0A7A-443E-AAF7-31D4FA1AA312}" type="datetimeFigureOut">
               <a:rPr lang="en-US" smtClean="0"/>
-              <a:t>11/5/2016</a:t>
+              <a:t>11/19/2016</a:t>
             </a:fld>
             <a:endParaRPr lang="en-US"/>
           </a:p>
@@ -4575,7 +4575,7 @@
           <a:p>
             <a:fld id="{9AFE8FB1-0A7A-443E-AAF7-31D4FA1AA312}" type="datetimeFigureOut">
               <a:rPr lang="en-US" smtClean="0"/>
-              <a:t>11/5/2016</a:t>
+              <a:t>11/19/2016</a:t>
             </a:fld>
             <a:endParaRPr lang="en-US"/>
           </a:p>
@@ -4875,7 +4875,7 @@
             <a:fld id="{9AFE8FB1-0A7A-443E-AAF7-31D4FA1AA312}" type="datetimeFigureOut">
               <a:rPr lang="en-US" smtClean="0"/>
               <a:pPr/>
-              <a:t>11/5/2016</a:t>
+              <a:t>11/19/2016</a:t>
             </a:fld>
             <a:endParaRPr lang="en-US"/>
           </a:p>
@@ -6746,6 +6746,16 @@
             <a:r>
               <a:rPr lang="en-US" sz="2000"/>
               <a:t>Extension method trong .NET, (cho các class bị sealed vẫn có thể thêm vào các phương thức).</a:t>
+            </a:r>
+          </a:p>
+          <a:p>
+            <a:pPr lvl="1">
+              <a:buFont typeface="Arial" panose="020B0604020202020204" pitchFamily="34" charset="0"/>
+              <a:buChar char="•"/>
+            </a:pPr>
+            <a:r>
+              <a:rPr lang="en-US" sz="2000"/>
+              <a:t>Extension Method trong C# áp dụng mẫu này.</a:t>
             </a:r>
           </a:p>
           <a:p>

</xml_diff>